<commit_message>
Added in my section of the questions
</commit_message>
<xml_diff>
--- a/Computer Science Workshop Presentation.pptx
+++ b/Computer Science Workshop Presentation.pptx
@@ -6423,7 +6423,7 @@
           <a:p>
             <a:r>
               <a:rPr lang="en-GB" dirty="0"/>
-              <a:t>Questions (name here)</a:t>
+              <a:t>Questions (Jake)</a:t>
             </a:r>
           </a:p>
         </p:txBody>
@@ -6449,7 +6449,141 @@
           <a:bodyPr/>
           <a:lstStyle/>
           <a:p>
-            <a:endParaRPr lang="en-GB"/>
+            <a:r>
+              <a:rPr lang="en-GB" dirty="0"/>
+              <a:t>7. What are the job titles for the lowest ten paying jobs (in ascending order)? </a:t>
+            </a:r>
+          </a:p>
+          <a:p>
+            <a:endParaRPr lang="en-GB" dirty="0"/>
+          </a:p>
+          <a:p>
+            <a:endParaRPr lang="en-GB" dirty="0"/>
+          </a:p>
+          <a:p>
+            <a:endParaRPr lang="en-GB" dirty="0"/>
+          </a:p>
+          <a:p>
+            <a:endParaRPr lang="en-GB" dirty="0"/>
+          </a:p>
+          <a:p>
+            <a:endParaRPr lang="en-GB" dirty="0"/>
+          </a:p>
+          <a:p>
+            <a:endParaRPr lang="en-GB" dirty="0"/>
+          </a:p>
+          <a:p>
+            <a:endParaRPr lang="en-GB" dirty="0"/>
+          </a:p>
+          <a:p>
+            <a:endParaRPr lang="en-GB" dirty="0"/>
+          </a:p>
+          <a:p>
+            <a:endParaRPr lang="en-GB" dirty="0"/>
+          </a:p>
+        </p:txBody>
+      </p:sp>
+      <p:pic>
+        <p:nvPicPr>
+          <p:cNvPr id="5" name="Picture 4">
+            <a:extLst>
+              <a:ext uri="{FF2B5EF4-FFF2-40B4-BE49-F238E27FC236}">
+                <a16:creationId xmlns:a16="http://schemas.microsoft.com/office/drawing/2014/main" id="{7A1FBA96-E3F8-673B-72A0-651F1C198EE1}"/>
+              </a:ext>
+            </a:extLst>
+          </p:cNvPr>
+          <p:cNvPicPr>
+            <a:picLocks noChangeAspect="1"/>
+          </p:cNvPicPr>
+          <p:nvPr/>
+        </p:nvPicPr>
+        <p:blipFill>
+          <a:blip r:embed="rId2"/>
+          <a:stretch>
+            <a:fillRect/>
+          </a:stretch>
+        </p:blipFill>
+        <p:spPr>
+          <a:xfrm>
+            <a:off x="2" y="3952875"/>
+            <a:ext cx="4124324" cy="2905124"/>
+          </a:xfrm>
+          <a:prstGeom prst="rect">
+            <a:avLst/>
+          </a:prstGeom>
+        </p:spPr>
+      </p:pic>
+      <p:pic>
+        <p:nvPicPr>
+          <p:cNvPr id="6" name="Picture 5" descr="A screenshot of a computer screen&#10;&#10;AI-generated content may be incorrect.">
+            <a:extLst>
+              <a:ext uri="{FF2B5EF4-FFF2-40B4-BE49-F238E27FC236}">
+                <a16:creationId xmlns:a16="http://schemas.microsoft.com/office/drawing/2014/main" id="{09BAD844-0776-9C63-C03B-17E4A88290C3}"/>
+              </a:ext>
+            </a:extLst>
+          </p:cNvPr>
+          <p:cNvPicPr>
+            <a:picLocks noChangeAspect="1"/>
+          </p:cNvPicPr>
+          <p:nvPr/>
+        </p:nvPicPr>
+        <p:blipFill>
+          <a:blip r:embed="rId3"/>
+          <a:stretch>
+            <a:fillRect/>
+          </a:stretch>
+        </p:blipFill>
+        <p:spPr>
+          <a:xfrm>
+            <a:off x="4124327" y="5095874"/>
+            <a:ext cx="3256785" cy="1762125"/>
+          </a:xfrm>
+          <a:prstGeom prst="rect">
+            <a:avLst/>
+          </a:prstGeom>
+        </p:spPr>
+      </p:pic>
+      <p:sp>
+        <p:nvSpPr>
+          <p:cNvPr id="7" name="TextBox 6">
+            <a:extLst>
+              <a:ext uri="{FF2B5EF4-FFF2-40B4-BE49-F238E27FC236}">
+                <a16:creationId xmlns:a16="http://schemas.microsoft.com/office/drawing/2014/main" id="{A26C25FB-486B-9E55-1766-6D5D1E2F6B35}"/>
+              </a:ext>
+            </a:extLst>
+          </p:cNvPr>
+          <p:cNvSpPr txBox="1"/>
+          <p:nvPr/>
+        </p:nvSpPr>
+        <p:spPr>
+          <a:xfrm>
+            <a:off x="4210050" y="2505075"/>
+            <a:ext cx="7867650" cy="2031325"/>
+          </a:xfrm>
+          <a:prstGeom prst="rect">
+            <a:avLst/>
+          </a:prstGeom>
+          <a:noFill/>
+        </p:spPr>
+        <p:txBody>
+          <a:bodyPr wrap="square" rtlCol="0">
+            <a:spAutoFit/>
+          </a:bodyPr>
+          <a:lstStyle/>
+          <a:p>
+            <a:r>
+              <a:rPr lang="en-GB" dirty="0"/>
+              <a:t>As we can see in the results, a range of ~$25,000 between the lowest paying job title and the tenth lowest paying job title but also shows differences in what the job is about. </a:t>
+            </a:r>
+          </a:p>
+          <a:p>
+            <a:endParaRPr lang="en-GB" dirty="0"/>
+          </a:p>
+          <a:p>
+            <a:r>
+              <a:rPr lang="en-GB" dirty="0"/>
+              <a:t>The lowest paying job is an analytics analyst at $24,000 whereas a people data analyst makes over $20,00 more than that showing the things they are analysing are important to consider.</a:t>
+            </a:r>
           </a:p>
         </p:txBody>
       </p:sp>
@@ -6512,7 +6646,7 @@
           <a:p>
             <a:r>
               <a:rPr lang="en-GB" dirty="0"/>
-              <a:t>Questions (name here)</a:t>
+              <a:t>Questions (Jake)</a:t>
             </a:r>
           </a:p>
         </p:txBody>
@@ -6538,7 +6672,83 @@
           <a:bodyPr/>
           <a:lstStyle/>
           <a:p>
-            <a:endParaRPr lang="en-GB"/>
+            <a:r>
+              <a:rPr lang="en-GB" dirty="0"/>
+              <a:t>8. What is the main trend between experience level and salary?</a:t>
+            </a:r>
+          </a:p>
+        </p:txBody>
+      </p:sp>
+      <p:pic>
+        <p:nvPicPr>
+          <p:cNvPr id="5" name="Picture 4">
+            <a:extLst>
+              <a:ext uri="{FF2B5EF4-FFF2-40B4-BE49-F238E27FC236}">
+                <a16:creationId xmlns:a16="http://schemas.microsoft.com/office/drawing/2014/main" id="{A1CA0474-FCE2-1811-BD44-F12D331A4558}"/>
+              </a:ext>
+            </a:extLst>
+          </p:cNvPr>
+          <p:cNvPicPr>
+            <a:picLocks noChangeAspect="1"/>
+          </p:cNvPicPr>
+          <p:nvPr/>
+        </p:nvPicPr>
+        <p:blipFill>
+          <a:blip r:embed="rId2"/>
+          <a:stretch>
+            <a:fillRect/>
+          </a:stretch>
+        </p:blipFill>
+        <p:spPr>
+          <a:xfrm>
+            <a:off x="0" y="4216164"/>
+            <a:ext cx="3790950" cy="2641836"/>
+          </a:xfrm>
+          <a:prstGeom prst="rect">
+            <a:avLst/>
+          </a:prstGeom>
+        </p:spPr>
+      </p:pic>
+      <p:sp>
+        <p:nvSpPr>
+          <p:cNvPr id="6" name="TextBox 5">
+            <a:extLst>
+              <a:ext uri="{FF2B5EF4-FFF2-40B4-BE49-F238E27FC236}">
+                <a16:creationId xmlns:a16="http://schemas.microsoft.com/office/drawing/2014/main" id="{97E135A6-21DE-9C5F-0FAB-F552CFC99313}"/>
+              </a:ext>
+            </a:extLst>
+          </p:cNvPr>
+          <p:cNvSpPr txBox="1"/>
+          <p:nvPr/>
+        </p:nvSpPr>
+        <p:spPr>
+          <a:xfrm>
+            <a:off x="4629150" y="3228975"/>
+            <a:ext cx="7305675" cy="1754326"/>
+          </a:xfrm>
+          <a:prstGeom prst="rect">
+            <a:avLst/>
+          </a:prstGeom>
+          <a:noFill/>
+        </p:spPr>
+        <p:txBody>
+          <a:bodyPr wrap="square" rtlCol="0">
+            <a:spAutoFit/>
+          </a:bodyPr>
+          <a:lstStyle/>
+          <a:p>
+            <a:r>
+              <a:rPr lang="en-GB" dirty="0"/>
+              <a:t>As we can see The executive-level holds the highest average closely followed by Senior level. Mid level follows closely behind that but there </a:t>
+            </a:r>
+            <a:r>
+              <a:rPr lang="en-GB"/>
+              <a:t>is a </a:t>
+            </a:r>
+            <a:r>
+              <a:rPr lang="en-GB" dirty="0"/>
+              <a:t>noticeable difference when we get to entry level, however this is to be expected. So, although the order is as expected we can still see to what extent and how closely each are followed with each other.</a:t>
+            </a:r>
           </a:p>
         </p:txBody>
       </p:sp>

</xml_diff>

<commit_message>
Changed the chart from vertical to horizontal for question 2 and a few other changes
</commit_message>
<xml_diff>
--- a/Computer Science Workshop Presentation.pptx
+++ b/Computer Science Workshop Presentation.pptx
@@ -6804,14 +6804,19 @@
             <p:ph type="title"/>
           </p:nvPr>
         </p:nvSpPr>
-        <p:spPr/>
+        <p:spPr>
+          <a:xfrm>
+            <a:off x="646111" y="452718"/>
+            <a:ext cx="9404723" cy="1074424"/>
+          </a:xfrm>
+        </p:spPr>
         <p:txBody>
           <a:bodyPr/>
           <a:lstStyle/>
           <a:p>
             <a:r>
               <a:rPr lang="en-GB" dirty="0"/>
-              <a:t>Questions (name here)</a:t>
+              <a:t>Questions (Fiyin)</a:t>
             </a:r>
           </a:p>
         </p:txBody>
@@ -6832,15 +6837,116 @@
             <p:ph idx="1"/>
           </p:nvPr>
         </p:nvSpPr>
-        <p:spPr/>
-        <p:txBody>
-          <a:bodyPr/>
-          <a:lstStyle/>
-          <a:p>
-            <a:endParaRPr lang="en-GB"/>
-          </a:p>
-        </p:txBody>
-      </p:sp>
+        <p:spPr>
+          <a:xfrm>
+            <a:off x="1103312" y="1696825"/>
+            <a:ext cx="8946541" cy="4551574"/>
+          </a:xfrm>
+        </p:spPr>
+        <p:txBody>
+          <a:bodyPr/>
+          <a:lstStyle/>
+          <a:p>
+            <a:r>
+              <a:rPr lang="en-GB" kern="100" dirty="0">
+                <a:effectLst/>
+                <a:ea typeface="Microsoft YaHei" panose="020B0503020204020204" pitchFamily="34" charset="-122"/>
+                <a:cs typeface="Sans Serif Collection" panose="020B0502040504020204" pitchFamily="34" charset="0"/>
+              </a:rPr>
+              <a:t>Which countries offer the highest salaries for AI professionals?</a:t>
+            </a:r>
+            <a:endParaRPr lang="en-US" kern="100" dirty="0">
+              <a:effectLst/>
+              <a:ea typeface="Aptos"/>
+              <a:cs typeface="Times New Roman" panose="02020603050405020304" pitchFamily="18" charset="0"/>
+            </a:endParaRPr>
+          </a:p>
+          <a:p>
+            <a:r>
+              <a:rPr lang="en-US" dirty="0"/>
+              <a:t>The top 10 countries with the highest </a:t>
+            </a:r>
+            <a:r>
+              <a:rPr lang="en-US" b="1" dirty="0"/>
+              <a:t>average AI salaries</a:t>
+            </a:r>
+            <a:r>
+              <a:rPr lang="en-US" dirty="0"/>
+              <a:t> were identified based on employee residence. </a:t>
+            </a:r>
+          </a:p>
+          <a:p>
+            <a:r>
+              <a:rPr lang="en-US" dirty="0"/>
+              <a:t>Countries like Qatar, Morocco, and Venezuela lead the list. Salaries are highest in regions with strong tech industries and high living costs.</a:t>
+            </a:r>
+          </a:p>
+          <a:p>
+            <a:pPr marL="0" indent="0">
+              <a:buNone/>
+            </a:pPr>
+            <a:endParaRPr lang="en-GB" dirty="0"/>
+          </a:p>
+        </p:txBody>
+      </p:sp>
+      <p:pic>
+        <p:nvPicPr>
+          <p:cNvPr id="7" name="Picture 6">
+            <a:extLst>
+              <a:ext uri="{FF2B5EF4-FFF2-40B4-BE49-F238E27FC236}">
+                <a16:creationId xmlns:a16="http://schemas.microsoft.com/office/drawing/2014/main" id="{DBCB226C-A4C0-4C3D-A4C8-D630E2584027}"/>
+              </a:ext>
+            </a:extLst>
+          </p:cNvPr>
+          <p:cNvPicPr/>
+          <p:nvPr/>
+        </p:nvPicPr>
+        <p:blipFill>
+          <a:blip r:embed="rId2"/>
+          <a:stretch>
+            <a:fillRect/>
+          </a:stretch>
+        </p:blipFill>
+        <p:spPr>
+          <a:xfrm>
+            <a:off x="0" y="4266415"/>
+            <a:ext cx="5326144" cy="2619865"/>
+          </a:xfrm>
+          <a:prstGeom prst="rect">
+            <a:avLst/>
+          </a:prstGeom>
+        </p:spPr>
+      </p:pic>
+      <p:pic>
+        <p:nvPicPr>
+          <p:cNvPr id="9" name="Picture 8">
+            <a:extLst>
+              <a:ext uri="{FF2B5EF4-FFF2-40B4-BE49-F238E27FC236}">
+                <a16:creationId xmlns:a16="http://schemas.microsoft.com/office/drawing/2014/main" id="{A4AC3B0E-E866-4BEB-B6E7-31053DB14237}"/>
+              </a:ext>
+            </a:extLst>
+          </p:cNvPr>
+          <p:cNvPicPr>
+            <a:picLocks noChangeAspect="1"/>
+          </p:cNvPicPr>
+          <p:nvPr/>
+        </p:nvPicPr>
+        <p:blipFill>
+          <a:blip r:embed="rId3"/>
+          <a:stretch>
+            <a:fillRect/>
+          </a:stretch>
+        </p:blipFill>
+        <p:spPr>
+          <a:xfrm>
+            <a:off x="5910606" y="3834017"/>
+            <a:ext cx="6281394" cy="3023983"/>
+          </a:xfrm>
+          <a:prstGeom prst="rect">
+            <a:avLst/>
+          </a:prstGeom>
+        </p:spPr>
+      </p:pic>
     </p:spTree>
     <p:extLst>
       <p:ext uri="{BB962C8B-B14F-4D97-AF65-F5344CB8AC3E}">
@@ -6900,7 +7006,7 @@
           <a:p>
             <a:r>
               <a:rPr lang="en-GB" dirty="0"/>
-              <a:t>Questions (name here)</a:t>
+              <a:t>Questions (Fiyin)</a:t>
             </a:r>
           </a:p>
         </p:txBody>
@@ -6921,15 +7027,112 @@
             <p:ph idx="1"/>
           </p:nvPr>
         </p:nvSpPr>
-        <p:spPr/>
-        <p:txBody>
-          <a:bodyPr/>
-          <a:lstStyle/>
-          <a:p>
-            <a:endParaRPr lang="en-GB"/>
-          </a:p>
-        </p:txBody>
-      </p:sp>
+        <p:spPr>
+          <a:xfrm>
+            <a:off x="990190" y="1515590"/>
+            <a:ext cx="8946541" cy="4195481"/>
+          </a:xfrm>
+        </p:spPr>
+        <p:txBody>
+          <a:bodyPr>
+            <a:normAutofit/>
+          </a:bodyPr>
+          <a:lstStyle/>
+          <a:p>
+            <a:r>
+              <a:rPr lang="en-US" sz="1800" kern="0" dirty="0">
+                <a:effectLst/>
+                <a:ea typeface="Times New Roman" panose="02020603050405020304" pitchFamily="18" charset="0"/>
+                <a:cs typeface="Sans Serif Collection" panose="020B0502040504020204" pitchFamily="34" charset="0"/>
+              </a:rPr>
+              <a:t>What are the highest-paying AI job titles?</a:t>
+            </a:r>
+          </a:p>
+          <a:p>
+            <a:r>
+              <a:rPr lang="en-US" sz="1800" dirty="0"/>
+              <a:t>The top 8 highest-paying AI roles were identified based on average salary in USD.</a:t>
+            </a:r>
+          </a:p>
+          <a:p>
+            <a:r>
+              <a:rPr lang="en-US" sz="1800" dirty="0"/>
+              <a:t>With  Analytics Engineering Manager, Data Science Tech Lead, and Applied AI/ML Lead coming out as the top 3 most paid roles.</a:t>
+            </a:r>
+          </a:p>
+          <a:p>
+            <a:r>
+              <a:rPr lang="en-US" sz="1800" dirty="0"/>
+              <a:t> These positions typically require advanced expertise and leadership responsibilities.</a:t>
+            </a:r>
+            <a:endParaRPr lang="en-US" sz="1800" kern="100" dirty="0">
+              <a:effectLst/>
+              <a:ea typeface="Aptos"/>
+              <a:cs typeface="Times New Roman" panose="02020603050405020304" pitchFamily="18" charset="0"/>
+            </a:endParaRPr>
+          </a:p>
+        </p:txBody>
+      </p:sp>
+      <p:pic>
+        <p:nvPicPr>
+          <p:cNvPr id="6" name="Picture 5">
+            <a:extLst>
+              <a:ext uri="{FF2B5EF4-FFF2-40B4-BE49-F238E27FC236}">
+                <a16:creationId xmlns:a16="http://schemas.microsoft.com/office/drawing/2014/main" id="{75CB0B96-F514-4FA4-AF5B-33640EE4E3B8}"/>
+              </a:ext>
+            </a:extLst>
+          </p:cNvPr>
+          <p:cNvPicPr>
+            <a:picLocks noChangeAspect="1"/>
+          </p:cNvPicPr>
+          <p:nvPr/>
+        </p:nvPicPr>
+        <p:blipFill>
+          <a:blip r:embed="rId2"/>
+          <a:stretch>
+            <a:fillRect/>
+          </a:stretch>
+        </p:blipFill>
+        <p:spPr>
+          <a:xfrm>
+            <a:off x="0" y="4582211"/>
+            <a:ext cx="6096000" cy="2257720"/>
+          </a:xfrm>
+          <a:prstGeom prst="rect">
+            <a:avLst/>
+          </a:prstGeom>
+        </p:spPr>
+      </p:pic>
+      <p:pic>
+        <p:nvPicPr>
+          <p:cNvPr id="10" name="Picture 9">
+            <a:extLst>
+              <a:ext uri="{FF2B5EF4-FFF2-40B4-BE49-F238E27FC236}">
+                <a16:creationId xmlns:a16="http://schemas.microsoft.com/office/drawing/2014/main" id="{E4FEA8D0-7DBA-454D-8D4A-2568E2A92DAB}"/>
+              </a:ext>
+            </a:extLst>
+          </p:cNvPr>
+          <p:cNvPicPr>
+            <a:picLocks noChangeAspect="1"/>
+          </p:cNvPicPr>
+          <p:nvPr/>
+        </p:nvPicPr>
+        <p:blipFill>
+          <a:blip r:embed="rId3"/>
+          <a:stretch>
+            <a:fillRect/>
+          </a:stretch>
+        </p:blipFill>
+        <p:spPr>
+          <a:xfrm>
+            <a:off x="6096000" y="3582186"/>
+            <a:ext cx="6170063" cy="3275814"/>
+          </a:xfrm>
+          <a:prstGeom prst="rect">
+            <a:avLst/>
+          </a:prstGeom>
+        </p:spPr>
+      </p:pic>
     </p:spTree>
     <p:extLst>
       <p:ext uri="{BB962C8B-B14F-4D97-AF65-F5344CB8AC3E}">

</xml_diff>

<commit_message>
added extra point onto the evaluation slide, fixed typos
</commit_message>
<xml_diff>
--- a/Computer Science Workshop Presentation.pptx
+++ b/Computer Science Workshop Presentation.pptx
@@ -7884,7 +7884,7 @@
                 <a:ea typeface="Microsoft YaHei" panose="020B0503020204020204" pitchFamily="34" charset="-122"/>
                 <a:cs typeface="Sans Serif Collection" panose="020B0502040504020204" pitchFamily="34" charset="-78"/>
               </a:rPr>
-              <a:t> to the members of a group and helped show how teamwork in the field</a:t>
+              <a:t> to the members of a group and helped show how teams work in the field</a:t>
             </a:r>
             <a:endParaRPr lang="en-GB" sz="1800" kern="100" dirty="0">
               <a:effectLst/>
@@ -7902,6 +7902,41 @@
                 <a:cs typeface="Sans Serif Collection" panose="020B0502040504020204" pitchFamily="34" charset="-78"/>
               </a:rPr>
               <a:t>Challenges: merging conflicts creating potential losses in progress and long periods of checking files for incorrect changes, finding periods where the whole group can communicate progress on the project.</a:t>
+            </a:r>
+            <a:r>
+              <a:rPr lang="en-GB" kern="100" dirty="0">
+                <a:latin typeface="Aptos" panose="020B0004020202020204" pitchFamily="34" charset="0"/>
+                <a:ea typeface="Microsoft YaHei" panose="020B0503020204020204" pitchFamily="34" charset="-122"/>
+                <a:cs typeface="Sans Serif Collection" panose="020B0502040504020204" pitchFamily="34" charset="-78"/>
+              </a:rPr>
+              <a:t> </a:t>
+            </a:r>
+          </a:p>
+          <a:p>
+            <a:r>
+              <a:rPr lang="en-GB" sz="2000" kern="100" dirty="0">
+                <a:effectLst/>
+                <a:latin typeface="Aptos" panose="020B0004020202020204" pitchFamily="34" charset="0"/>
+                <a:ea typeface="Microsoft YaHei" panose="020B0503020204020204" pitchFamily="34" charset="-122"/>
+                <a:cs typeface="Sans Serif Collection" panose="020B0502040504020204" pitchFamily="34" charset="-78"/>
+              </a:rPr>
+              <a:t>Som</a:t>
+            </a:r>
+            <a:r>
+              <a:rPr lang="en-GB" kern="100" dirty="0">
+                <a:latin typeface="Aptos" panose="020B0004020202020204" pitchFamily="34" charset="0"/>
+                <a:ea typeface="Microsoft YaHei" panose="020B0503020204020204" pitchFamily="34" charset="-122"/>
+                <a:cs typeface="Sans Serif Collection" panose="020B0502040504020204" pitchFamily="34" charset="-78"/>
+              </a:rPr>
+              <a:t>e columns in the dataset were heavily dominated by one thing which made it difficult to compare to other columns and come up with visualisations. Employment type </a:t>
+            </a:r>
+            <a:r>
+              <a:rPr lang="en-GB" kern="100">
+                <a:latin typeface="Aptos" panose="020B0004020202020204" pitchFamily="34" charset="0"/>
+                <a:ea typeface="Microsoft YaHei" panose="020B0503020204020204" pitchFamily="34" charset="-122"/>
+                <a:cs typeface="Sans Serif Collection" panose="020B0502040504020204" pitchFamily="34" charset="-78"/>
+              </a:rPr>
+              <a:t>was practically 100% full time for example</a:t>
             </a:r>
             <a:endParaRPr lang="en-GB" sz="2000" kern="100" dirty="0">
               <a:effectLst/>

</xml_diff>

<commit_message>
added in missing code for my section
</commit_message>
<xml_diff>
--- a/Computer Science Workshop Presentation.pptx
+++ b/Computer Science Workshop Presentation.pptx
@@ -6725,7 +6725,7 @@
         </p:nvSpPr>
         <p:spPr>
           <a:xfrm>
-            <a:off x="4629150" y="3228975"/>
+            <a:off x="4538615" y="2626354"/>
             <a:ext cx="7305675" cy="1754326"/>
           </a:xfrm>
           <a:prstGeom prst="rect">
@@ -6741,19 +6741,41 @@
           <a:p>
             <a:r>
               <a:rPr lang="en-GB" dirty="0"/>
-              <a:t>As we can see The executive-level holds the highest average closely followed by Senior level. Mid level follows closely behind that but there </a:t>
-            </a:r>
-            <a:r>
-              <a:rPr lang="en-GB"/>
-              <a:t>is a </a:t>
-            </a:r>
-            <a:r>
-              <a:rPr lang="en-GB" dirty="0"/>
-              <a:t>noticeable difference when we get to entry level, however this is to be expected. So, although the order is as expected we can still see to what extent and how closely each are followed with each other.</a:t>
-            </a:r>
-          </a:p>
-        </p:txBody>
-      </p:sp>
+              <a:t>As we can see The executive-level holds the highest average closely followed by Senior level. Mid level follows closely behind that but there is a noticeable difference when we get to entry level, however this is to be expected. So, although the order is as expected we can still see to what extent and how closely each are followed with each other.</a:t>
+            </a:r>
+          </a:p>
+        </p:txBody>
+      </p:sp>
+      <p:pic>
+        <p:nvPicPr>
+          <p:cNvPr id="7" name="Picture 6">
+            <a:extLst>
+              <a:ext uri="{FF2B5EF4-FFF2-40B4-BE49-F238E27FC236}">
+                <a16:creationId xmlns:a16="http://schemas.microsoft.com/office/drawing/2014/main" id="{79188FD7-B4C0-5AE1-CBC9-8CD64B1FE960}"/>
+              </a:ext>
+            </a:extLst>
+          </p:cNvPr>
+          <p:cNvPicPr>
+            <a:picLocks noChangeAspect="1"/>
+          </p:cNvPicPr>
+          <p:nvPr/>
+        </p:nvPicPr>
+        <p:blipFill>
+          <a:blip r:embed="rId3"/>
+          <a:stretch>
+            <a:fillRect/>
+          </a:stretch>
+        </p:blipFill>
+        <p:spPr>
+          <a:xfrm>
+            <a:off x="7767873" y="4380680"/>
+            <a:ext cx="4424127" cy="2500268"/>
+          </a:xfrm>
+          <a:prstGeom prst="rect">
+            <a:avLst/>
+          </a:prstGeom>
+        </p:spPr>
+      </p:pic>
     </p:spTree>
     <p:extLst>
       <p:ext uri="{BB962C8B-B14F-4D97-AF65-F5344CB8AC3E}">

</xml_diff>